<commit_message>
last minute updates to presentation
</commit_message>
<xml_diff>
--- a/presentation/python_ml.pptx
+++ b/presentation/python_ml.pptx
@@ -110,7 +110,16 @@
       </a:defRPr>
     </a:lvl9pPr>
   </p:defaultTextStyle>
+  <p:extLst>
+    <p:ext uri="{EFAFB233-063F-42B5-8137-9DF3F51BA10A}">
+      <p15:sldGuideLst xmlns:p15="http://schemas.microsoft.com/office/powerpoint/2012/main"/>
+    </p:ext>
+  </p:extLst>
 </p:presentation>
+</file>
+
+<file path=ppt/revisionInfo.xml><?xml version="1.0" encoding="utf-8"?>
+<p1510:revInfo xmlns:a="http://schemas.openxmlformats.org/drawingml/2006/main" xmlns:r="http://schemas.openxmlformats.org/officeDocument/2006/relationships" xmlns:p1510="http://schemas.microsoft.com/office/powerpoint/2015/10/main"/>
 </file>
 
 <file path=ppt/slideLayouts/slideLayout1.xml><?xml version="1.0" encoding="utf-8"?>
@@ -252,7 +261,7 @@
           <a:p>
             <a:fld id="{A423BF71-38B7-8642-BFCE-EDAE9BD0CBAF}" type="datetimeFigureOut">
               <a:rPr lang="en-US" dirty="0"/>
-              <a:t>9/10/2017</a:t>
+              <a:t>9/15/2017</a:t>
             </a:fld>
             <a:endParaRPr lang="en-US" dirty="0"/>
           </a:p>
@@ -464,7 +473,7 @@
           <a:p>
             <a:fld id="{73B025CB-9D18-264E-A945-2D020344C9DA}" type="datetimeFigureOut">
               <a:rPr lang="en-US" dirty="0"/>
-              <a:t>9/10/2017</a:t>
+              <a:t>9/15/2017</a:t>
             </a:fld>
             <a:endParaRPr lang="en-US" dirty="0"/>
           </a:p>
@@ -680,7 +689,7 @@
           <a:p>
             <a:fld id="{507EFB6C-7E96-8F41-8872-189CA1C59F84}" type="datetimeFigureOut">
               <a:rPr lang="en-US" dirty="0"/>
-              <a:t>9/10/2017</a:t>
+              <a:t>9/15/2017</a:t>
             </a:fld>
             <a:endParaRPr lang="en-US" dirty="0"/>
           </a:p>
@@ -882,7 +891,7 @@
           <a:p>
             <a:fld id="{B6981CDE-9BE7-C544-8ACB-7077DFC4270F}" type="datetimeFigureOut">
               <a:rPr lang="en-US" dirty="0"/>
-              <a:t>9/10/2017</a:t>
+              <a:t>9/15/2017</a:t>
             </a:fld>
             <a:endParaRPr lang="en-US" dirty="0"/>
           </a:p>
@@ -1162,7 +1171,7 @@
           <a:p>
             <a:fld id="{B55BA285-9698-1B45-8319-D90A8C63F150}" type="datetimeFigureOut">
               <a:rPr lang="en-US" dirty="0"/>
-              <a:t>9/10/2017</a:t>
+              <a:t>9/15/2017</a:t>
             </a:fld>
             <a:endParaRPr lang="en-US" dirty="0"/>
           </a:p>
@@ -1431,7 +1440,7 @@
           <a:p>
             <a:fld id="{0A86CD42-43FF-B740-998F-DCC3802C4CE3}" type="datetimeFigureOut">
               <a:rPr lang="en-US" dirty="0"/>
-              <a:t>9/10/2017</a:t>
+              <a:t>9/15/2017</a:t>
             </a:fld>
             <a:endParaRPr lang="en-US" dirty="0"/>
           </a:p>
@@ -1848,7 +1857,7 @@
           <a:p>
             <a:fld id="{CEA0FFBD-2EE4-8547-BBAE-A1AC91C8D77E}" type="datetimeFigureOut">
               <a:rPr lang="en-US" dirty="0"/>
-              <a:t>9/10/2017</a:t>
+              <a:t>9/15/2017</a:t>
             </a:fld>
             <a:endParaRPr lang="en-US" dirty="0"/>
           </a:p>
@@ -1998,7 +2007,7 @@
           <a:p>
             <a:fld id="{955A2352-D7AC-F242-9256-A4477BCBF354}" type="datetimeFigureOut">
               <a:rPr lang="en-US" dirty="0"/>
-              <a:t>9/10/2017</a:t>
+              <a:t>9/15/2017</a:t>
             </a:fld>
             <a:endParaRPr lang="en-US" dirty="0"/>
           </a:p>
@@ -2125,7 +2134,7 @@
           <a:p>
             <a:fld id="{4EFCFC6A-9AE6-404D-9FDD-168B477B9C90}" type="datetimeFigureOut">
               <a:rPr lang="en-US" dirty="0"/>
-              <a:t>9/10/2017</a:t>
+              <a:t>9/15/2017</a:t>
             </a:fld>
             <a:endParaRPr lang="en-US" dirty="0"/>
           </a:p>
@@ -2371,7 +2380,7 @@
           <a:p>
             <a:fld id="{61CFCDFD-B4CF-A241-8D71-E814B10BEAF4}" type="datetimeFigureOut">
               <a:rPr lang="en-US" dirty="0"/>
-              <a:t>9/10/2017</a:t>
+              <a:t>9/15/2017</a:t>
             </a:fld>
             <a:endParaRPr lang="en-US" dirty="0"/>
           </a:p>
@@ -2821,7 +2830,7 @@
           <a:p>
             <a:fld id="{26A7B589-FD4B-7E46-869A-CBADC5FC564E}" type="datetimeFigureOut">
               <a:rPr lang="en-US" dirty="0"/>
-              <a:t>9/10/2017</a:t>
+              <a:t>9/15/2017</a:t>
             </a:fld>
             <a:endParaRPr lang="en-US" dirty="0"/>
           </a:p>
@@ -3142,7 +3151,7 @@
           <a:p>
             <a:fld id="{4CD8A92E-5FF9-8143-81B3-CCB531513398}" type="datetimeFigureOut">
               <a:rPr lang="en-US" dirty="0"/>
-              <a:t>9/10/2017</a:t>
+              <a:t>9/15/2017</a:t>
             </a:fld>
             <a:endParaRPr lang="en-US" dirty="0"/>
           </a:p>

</xml_diff>